<commit_message>
Reduced size and more info
</commit_message>
<xml_diff>
--- a/map reverse-engineering.pptx
+++ b/map reverse-engineering.pptx
@@ -3104,10 +3104,10 @@
           <p:nvPr/>
         </p:nvPicPr>
         <p:blipFill>
-          <a:blip r:embed="rId2">
+          <a:blip r:embed="rId2" cstate="screen">
             <a:extLst>
               <a:ext uri="{28A0092B-C50C-407E-A947-70E740481C1C}">
-                <a14:useLocalDpi xmlns:a14="http://schemas.microsoft.com/office/drawing/2010/main" val="0"/>
+                <a14:useLocalDpi xmlns:a14="http://schemas.microsoft.com/office/drawing/2010/main"/>
               </a:ext>
             </a:extLst>
           </a:blip>
@@ -3117,7 +3117,7 @@
         </p:blipFill>
         <p:spPr>
           <a:xfrm>
-            <a:off x="334822" y="0"/>
+            <a:off x="0" y="-19858"/>
             <a:ext cx="4087091" cy="5163358"/>
           </a:xfrm>
           <a:prstGeom prst="rect">
@@ -3134,10 +3134,10 @@
           <p:nvPr/>
         </p:nvPicPr>
         <p:blipFill>
-          <a:blip r:embed="rId3">
+          <a:blip r:embed="rId3" cstate="screen">
             <a:extLst>
               <a:ext uri="{28A0092B-C50C-407E-A947-70E740481C1C}">
-                <a14:useLocalDpi xmlns:a14="http://schemas.microsoft.com/office/drawing/2010/main" val="0"/>
+                <a14:useLocalDpi xmlns:a14="http://schemas.microsoft.com/office/drawing/2010/main"/>
               </a:ext>
             </a:extLst>
           </a:blip>
@@ -3147,7 +3147,7 @@
         </p:blipFill>
         <p:spPr>
           <a:xfrm>
-            <a:off x="3825112" y="864638"/>
+            <a:off x="3490290" y="828602"/>
             <a:ext cx="3433937" cy="4298720"/>
           </a:xfrm>
           <a:prstGeom prst="rect">
@@ -3155,6 +3155,128 @@
           </a:prstGeom>
         </p:spPr>
       </p:pic>
+      <p:sp>
+        <p:nvSpPr>
+          <p:cNvPr id="2" name="TextBox 1"/>
+          <p:cNvSpPr txBox="1"/>
+          <p:nvPr/>
+        </p:nvSpPr>
+        <p:spPr>
+          <a:xfrm>
+            <a:off x="6924226" y="0"/>
+            <a:ext cx="2219773" cy="5127322"/>
+          </a:xfrm>
+          <a:prstGeom prst="rect">
+            <a:avLst/>
+          </a:prstGeom>
+          <a:noFill/>
+        </p:spPr>
+        <p:txBody>
+          <a:bodyPr wrap="square" rtlCol="0">
+            <a:noAutofit/>
+          </a:bodyPr>
+          <a:lstStyle/>
+          <a:p>
+            <a:r>
+              <a:rPr lang="en-GB" sz="1200" dirty="0" smtClean="0"/>
+              <a:t>This PowerPoint is used just to read the map, square by square, and facilitate the creation of the data.csv file.</a:t>
+            </a:r>
+          </a:p>
+          <a:p>
+            <a:endParaRPr lang="en-GB" sz="1200" dirty="0" smtClean="0"/>
+          </a:p>
+          <a:p>
+            <a:r>
+              <a:rPr lang="en-GB" sz="1200" dirty="0" smtClean="0"/>
+              <a:t>The areas under consideration appear to have been defined by DECC as 10,000 x 10,000 squares, matching exactly the OS’ easting/northing grid. </a:t>
+            </a:r>
+          </a:p>
+          <a:p>
+            <a:endParaRPr lang="en-GB" sz="1200" dirty="0"/>
+          </a:p>
+          <a:p>
+            <a:r>
+              <a:rPr lang="en-GB" sz="1200" dirty="0" smtClean="0"/>
+              <a:t>The existing licences have more irregular shapes, much more difficult to measure from the map. Even zooming-in in the original PDF you can’t get to a level where the borders are clear.</a:t>
+            </a:r>
+          </a:p>
+          <a:p>
+            <a:endParaRPr lang="en-GB" sz="1200" dirty="0"/>
+          </a:p>
+          <a:p>
+            <a:r>
+              <a:rPr lang="en-GB" sz="1200" dirty="0" smtClean="0"/>
+              <a:t>Anyone who knows if the data behind these maps is available in a readable format is </a:t>
+            </a:r>
+            <a:r>
+              <a:rPr lang="en-GB" sz="1200" smtClean="0"/>
+              <a:t>very welcome.</a:t>
+            </a:r>
+            <a:endParaRPr lang="en-GB" sz="1200" dirty="0"/>
+          </a:p>
+        </p:txBody>
+      </p:sp>
+      <p:sp>
+        <p:nvSpPr>
+          <p:cNvPr id="3" name="TextBox 2"/>
+          <p:cNvSpPr txBox="1"/>
+          <p:nvPr/>
+        </p:nvSpPr>
+        <p:spPr>
+          <a:xfrm>
+            <a:off x="4087091" y="7514"/>
+            <a:ext cx="736480" cy="821087"/>
+          </a:xfrm>
+          <a:prstGeom prst="rect">
+            <a:avLst/>
+          </a:prstGeom>
+          <a:noFill/>
+        </p:spPr>
+        <p:txBody>
+          <a:bodyPr wrap="square" rtlCol="0" anchor="ctr" anchorCtr="0">
+            <a:noAutofit/>
+          </a:bodyPr>
+          <a:lstStyle/>
+          <a:p>
+            <a:r>
+              <a:rPr lang="en-US" sz="1100" dirty="0" smtClean="0"/>
+              <a:t>NTS 1</a:t>
+            </a:r>
+            <a:endParaRPr lang="en-US" sz="1100" dirty="0"/>
+          </a:p>
+        </p:txBody>
+      </p:sp>
+      <p:sp>
+        <p:nvSpPr>
+          <p:cNvPr id="8" name="TextBox 7"/>
+          <p:cNvSpPr txBox="1"/>
+          <p:nvPr/>
+        </p:nvSpPr>
+        <p:spPr>
+          <a:xfrm>
+            <a:off x="3490290" y="566992"/>
+            <a:ext cx="3433936" cy="261610"/>
+          </a:xfrm>
+          <a:prstGeom prst="rect">
+            <a:avLst/>
+          </a:prstGeom>
+          <a:noFill/>
+        </p:spPr>
+        <p:txBody>
+          <a:bodyPr wrap="square" rtlCol="0">
+            <a:spAutoFit/>
+          </a:bodyPr>
+          <a:lstStyle/>
+          <a:p>
+            <a:pPr algn="ctr"/>
+            <a:r>
+              <a:rPr lang="en-US" sz="1100" dirty="0" smtClean="0"/>
+              <a:t>NTS 2</a:t>
+            </a:r>
+            <a:endParaRPr lang="en-US" sz="1100" dirty="0"/>
+          </a:p>
+        </p:txBody>
+      </p:sp>
     </p:spTree>
     <p:extLst>
       <p:ext uri="{BB962C8B-B14F-4D97-AF65-F5344CB8AC3E}">

</xml_diff>